<commit_message>
checkpoint before v1 edits
</commit_message>
<xml_diff>
--- a/figure_annotation.pptx
+++ b/figure_annotation.pptx
@@ -6,6 +6,7 @@
   </p:sldMasterIdLst>
   <p:sldIdLst>
     <p:sldId id="256" r:id="rId2"/>
+    <p:sldId id="257" r:id="rId3"/>
   </p:sldIdLst>
   <p:sldSz cx="12192000" cy="6858000"/>
   <p:notesSz cx="6858000" cy="9144000"/>
@@ -104,6 +105,11 @@
       </a:defRPr>
     </a:lvl9pPr>
   </p:defaultTextStyle>
+  <p:extLst>
+    <p:ext uri="{EFAFB233-063F-42B5-8137-9DF3F51BA10A}">
+      <p15:sldGuideLst xmlns:p15="http://schemas.microsoft.com/office/powerpoint/2012/main"/>
+    </p:ext>
+  </p:extLst>
 </p:presentation>
 </file>
 
@@ -254,7 +260,7 @@
           <a:p>
             <a:fld id="{D344D8E2-D075-3146-8CE5-26AB13CF57C9}" type="datetimeFigureOut">
               <a:rPr lang="en-US" smtClean="0"/>
-              <a:t>8/28/23</a:t>
+              <a:t>9/5/23</a:t>
             </a:fld>
             <a:endParaRPr lang="en-US"/>
           </a:p>
@@ -452,7 +458,7 @@
           <a:p>
             <a:fld id="{D344D8E2-D075-3146-8CE5-26AB13CF57C9}" type="datetimeFigureOut">
               <a:rPr lang="en-US" smtClean="0"/>
-              <a:t>8/28/23</a:t>
+              <a:t>9/5/23</a:t>
             </a:fld>
             <a:endParaRPr lang="en-US"/>
           </a:p>
@@ -660,7 +666,7 @@
           <a:p>
             <a:fld id="{D344D8E2-D075-3146-8CE5-26AB13CF57C9}" type="datetimeFigureOut">
               <a:rPr lang="en-US" smtClean="0"/>
-              <a:t>8/28/23</a:t>
+              <a:t>9/5/23</a:t>
             </a:fld>
             <a:endParaRPr lang="en-US"/>
           </a:p>
@@ -858,7 +864,7 @@
           <a:p>
             <a:fld id="{D344D8E2-D075-3146-8CE5-26AB13CF57C9}" type="datetimeFigureOut">
               <a:rPr lang="en-US" smtClean="0"/>
-              <a:t>8/28/23</a:t>
+              <a:t>9/5/23</a:t>
             </a:fld>
             <a:endParaRPr lang="en-US"/>
           </a:p>
@@ -1133,7 +1139,7 @@
           <a:p>
             <a:fld id="{D344D8E2-D075-3146-8CE5-26AB13CF57C9}" type="datetimeFigureOut">
               <a:rPr lang="en-US" smtClean="0"/>
-              <a:t>8/28/23</a:t>
+              <a:t>9/5/23</a:t>
             </a:fld>
             <a:endParaRPr lang="en-US"/>
           </a:p>
@@ -1398,7 +1404,7 @@
           <a:p>
             <a:fld id="{D344D8E2-D075-3146-8CE5-26AB13CF57C9}" type="datetimeFigureOut">
               <a:rPr lang="en-US" smtClean="0"/>
-              <a:t>8/28/23</a:t>
+              <a:t>9/5/23</a:t>
             </a:fld>
             <a:endParaRPr lang="en-US"/>
           </a:p>
@@ -1810,7 +1816,7 @@
           <a:p>
             <a:fld id="{D344D8E2-D075-3146-8CE5-26AB13CF57C9}" type="datetimeFigureOut">
               <a:rPr lang="en-US" smtClean="0"/>
-              <a:t>8/28/23</a:t>
+              <a:t>9/5/23</a:t>
             </a:fld>
             <a:endParaRPr lang="en-US"/>
           </a:p>
@@ -1951,7 +1957,7 @@
           <a:p>
             <a:fld id="{D344D8E2-D075-3146-8CE5-26AB13CF57C9}" type="datetimeFigureOut">
               <a:rPr lang="en-US" smtClean="0"/>
-              <a:t>8/28/23</a:t>
+              <a:t>9/5/23</a:t>
             </a:fld>
             <a:endParaRPr lang="en-US"/>
           </a:p>
@@ -2064,7 +2070,7 @@
           <a:p>
             <a:fld id="{D344D8E2-D075-3146-8CE5-26AB13CF57C9}" type="datetimeFigureOut">
               <a:rPr lang="en-US" smtClean="0"/>
-              <a:t>8/28/23</a:t>
+              <a:t>9/5/23</a:t>
             </a:fld>
             <a:endParaRPr lang="en-US"/>
           </a:p>
@@ -2375,7 +2381,7 @@
           <a:p>
             <a:fld id="{D344D8E2-D075-3146-8CE5-26AB13CF57C9}" type="datetimeFigureOut">
               <a:rPr lang="en-US" smtClean="0"/>
-              <a:t>8/28/23</a:t>
+              <a:t>9/5/23</a:t>
             </a:fld>
             <a:endParaRPr lang="en-US"/>
           </a:p>
@@ -2663,7 +2669,7 @@
           <a:p>
             <a:fld id="{D344D8E2-D075-3146-8CE5-26AB13CF57C9}" type="datetimeFigureOut">
               <a:rPr lang="en-US" smtClean="0"/>
-              <a:t>8/28/23</a:t>
+              <a:t>9/5/23</a:t>
             </a:fld>
             <a:endParaRPr lang="en-US"/>
           </a:p>
@@ -2904,7 +2910,7 @@
           <a:p>
             <a:fld id="{D344D8E2-D075-3146-8CE5-26AB13CF57C9}" type="datetimeFigureOut">
               <a:rPr lang="en-US" smtClean="0"/>
-              <a:t>8/28/23</a:t>
+              <a:t>9/5/23</a:t>
             </a:fld>
             <a:endParaRPr lang="en-US"/>
           </a:p>
@@ -3384,6 +3390,968 @@
 </p:sld>
 </file>
 
+<file path=ppt/slides/slide2.xml><?xml version="1.0" encoding="utf-8"?>
+<p:sld xmlns:a="http://schemas.openxmlformats.org/drawingml/2006/main" xmlns:r="http://schemas.openxmlformats.org/officeDocument/2006/relationships" xmlns:p="http://schemas.openxmlformats.org/presentationml/2006/main">
+  <p:cSld>
+    <p:spTree>
+      <p:nvGrpSpPr>
+        <p:cNvPr id="1" name=""/>
+        <p:cNvGrpSpPr/>
+        <p:nvPr/>
+      </p:nvGrpSpPr>
+      <p:grpSpPr>
+        <a:xfrm>
+          <a:off x="0" y="0"/>
+          <a:ext cx="0" cy="0"/>
+          <a:chOff x="0" y="0"/>
+          <a:chExt cx="0" cy="0"/>
+        </a:xfrm>
+      </p:grpSpPr>
+      <p:pic>
+        <p:nvPicPr>
+          <p:cNvPr id="5" name="Picture 4" descr="A black sky with white dots&#10;&#10;Description automatically generated">
+            <a:extLst>
+              <a:ext uri="{FF2B5EF4-FFF2-40B4-BE49-F238E27FC236}">
+                <a16:creationId xmlns:a16="http://schemas.microsoft.com/office/drawing/2014/main" id="{BA7DD49E-A8F7-7CDB-CC2F-424278704EB3}"/>
+              </a:ext>
+            </a:extLst>
+          </p:cNvPr>
+          <p:cNvPicPr>
+            <a:picLocks noChangeAspect="1"/>
+          </p:cNvPicPr>
+          <p:nvPr/>
+        </p:nvPicPr>
+        <p:blipFill>
+          <a:blip r:embed="rId2"/>
+          <a:stretch>
+            <a:fillRect/>
+          </a:stretch>
+        </p:blipFill>
+        <p:spPr>
+          <a:xfrm>
+            <a:off x="2981454" y="419783"/>
+            <a:ext cx="6645876" cy="5561796"/>
+          </a:xfrm>
+          <a:prstGeom prst="rect">
+            <a:avLst/>
+          </a:prstGeom>
+        </p:spPr>
+      </p:pic>
+      <p:sp>
+        <p:nvSpPr>
+          <p:cNvPr id="6" name="Frame 5">
+            <a:extLst>
+              <a:ext uri="{FF2B5EF4-FFF2-40B4-BE49-F238E27FC236}">
+                <a16:creationId xmlns:a16="http://schemas.microsoft.com/office/drawing/2014/main" id="{4E2D54B2-AC7A-E7D0-6C36-075CD0A76E06}"/>
+              </a:ext>
+            </a:extLst>
+          </p:cNvPr>
+          <p:cNvSpPr/>
+          <p:nvPr/>
+        </p:nvSpPr>
+        <p:spPr>
+          <a:xfrm>
+            <a:off x="5849256" y="2941760"/>
+            <a:ext cx="246743" cy="241708"/>
+          </a:xfrm>
+          <a:prstGeom prst="frame">
+            <a:avLst>
+              <a:gd name="adj1" fmla="val 12425"/>
+            </a:avLst>
+          </a:prstGeom>
+          <a:solidFill>
+            <a:schemeClr val="accent4">
+              <a:lumMod val="60000"/>
+              <a:lumOff val="40000"/>
+            </a:schemeClr>
+          </a:solidFill>
+          <a:ln>
+            <a:noFill/>
+          </a:ln>
+        </p:spPr>
+        <p:style>
+          <a:lnRef idx="2">
+            <a:schemeClr val="accent1">
+              <a:shade val="15000"/>
+            </a:schemeClr>
+          </a:lnRef>
+          <a:fillRef idx="1">
+            <a:schemeClr val="accent1"/>
+          </a:fillRef>
+          <a:effectRef idx="0">
+            <a:schemeClr val="accent1"/>
+          </a:effectRef>
+          <a:fontRef idx="minor">
+            <a:schemeClr val="lt1"/>
+          </a:fontRef>
+        </p:style>
+        <p:txBody>
+          <a:bodyPr rtlCol="0" anchor="ctr"/>
+          <a:lstStyle/>
+          <a:p>
+            <a:pPr algn="ctr"/>
+            <a:endParaRPr lang="en-US">
+              <a:solidFill>
+                <a:schemeClr val="tx1"/>
+              </a:solidFill>
+            </a:endParaRPr>
+          </a:p>
+        </p:txBody>
+      </p:sp>
+      <p:sp>
+        <p:nvSpPr>
+          <p:cNvPr id="7" name="Frame 6">
+            <a:extLst>
+              <a:ext uri="{FF2B5EF4-FFF2-40B4-BE49-F238E27FC236}">
+                <a16:creationId xmlns:a16="http://schemas.microsoft.com/office/drawing/2014/main" id="{09FDBC3B-6165-1326-CFA7-D3669D497797}"/>
+              </a:ext>
+            </a:extLst>
+          </p:cNvPr>
+          <p:cNvSpPr/>
+          <p:nvPr/>
+        </p:nvSpPr>
+        <p:spPr>
+          <a:xfrm>
+            <a:off x="6243561" y="2823326"/>
+            <a:ext cx="246743" cy="241708"/>
+          </a:xfrm>
+          <a:prstGeom prst="frame">
+            <a:avLst>
+              <a:gd name="adj1" fmla="val 12425"/>
+            </a:avLst>
+          </a:prstGeom>
+          <a:solidFill>
+            <a:schemeClr val="accent4">
+              <a:lumMod val="60000"/>
+              <a:lumOff val="40000"/>
+            </a:schemeClr>
+          </a:solidFill>
+          <a:ln>
+            <a:noFill/>
+          </a:ln>
+        </p:spPr>
+        <p:style>
+          <a:lnRef idx="2">
+            <a:schemeClr val="accent1">
+              <a:shade val="15000"/>
+            </a:schemeClr>
+          </a:lnRef>
+          <a:fillRef idx="1">
+            <a:schemeClr val="accent1"/>
+          </a:fillRef>
+          <a:effectRef idx="0">
+            <a:schemeClr val="accent1"/>
+          </a:effectRef>
+          <a:fontRef idx="minor">
+            <a:schemeClr val="lt1"/>
+          </a:fontRef>
+        </p:style>
+        <p:txBody>
+          <a:bodyPr rtlCol="0" anchor="ctr"/>
+          <a:lstStyle/>
+          <a:p>
+            <a:pPr algn="ctr"/>
+            <a:endParaRPr lang="en-US">
+              <a:solidFill>
+                <a:schemeClr val="tx1"/>
+              </a:solidFill>
+            </a:endParaRPr>
+          </a:p>
+        </p:txBody>
+      </p:sp>
+      <p:sp>
+        <p:nvSpPr>
+          <p:cNvPr id="8" name="Frame 7">
+            <a:extLst>
+              <a:ext uri="{FF2B5EF4-FFF2-40B4-BE49-F238E27FC236}">
+                <a16:creationId xmlns:a16="http://schemas.microsoft.com/office/drawing/2014/main" id="{8B0B9522-0E15-F90E-D046-4BDD3378200E}"/>
+              </a:ext>
+            </a:extLst>
+          </p:cNvPr>
+          <p:cNvSpPr/>
+          <p:nvPr/>
+        </p:nvSpPr>
+        <p:spPr>
+          <a:xfrm>
+            <a:off x="6439504" y="3161978"/>
+            <a:ext cx="246743" cy="241708"/>
+          </a:xfrm>
+          <a:prstGeom prst="frame">
+            <a:avLst>
+              <a:gd name="adj1" fmla="val 12425"/>
+            </a:avLst>
+          </a:prstGeom>
+          <a:solidFill>
+            <a:schemeClr val="accent4">
+              <a:lumMod val="60000"/>
+              <a:lumOff val="40000"/>
+            </a:schemeClr>
+          </a:solidFill>
+          <a:ln>
+            <a:noFill/>
+          </a:ln>
+        </p:spPr>
+        <p:style>
+          <a:lnRef idx="2">
+            <a:schemeClr val="accent1">
+              <a:shade val="15000"/>
+            </a:schemeClr>
+          </a:lnRef>
+          <a:fillRef idx="1">
+            <a:schemeClr val="accent1"/>
+          </a:fillRef>
+          <a:effectRef idx="0">
+            <a:schemeClr val="accent1"/>
+          </a:effectRef>
+          <a:fontRef idx="minor">
+            <a:schemeClr val="lt1"/>
+          </a:fontRef>
+        </p:style>
+        <p:txBody>
+          <a:bodyPr rtlCol="0" anchor="ctr"/>
+          <a:lstStyle/>
+          <a:p>
+            <a:pPr algn="ctr"/>
+            <a:endParaRPr lang="en-US">
+              <a:solidFill>
+                <a:schemeClr val="tx1"/>
+              </a:solidFill>
+            </a:endParaRPr>
+          </a:p>
+        </p:txBody>
+      </p:sp>
+      <p:sp>
+        <p:nvSpPr>
+          <p:cNvPr id="9" name="Frame 8">
+            <a:extLst>
+              <a:ext uri="{FF2B5EF4-FFF2-40B4-BE49-F238E27FC236}">
+                <a16:creationId xmlns:a16="http://schemas.microsoft.com/office/drawing/2014/main" id="{887415BE-E95D-8D65-345F-7C43154FE88D}"/>
+              </a:ext>
+            </a:extLst>
+          </p:cNvPr>
+          <p:cNvSpPr/>
+          <p:nvPr/>
+        </p:nvSpPr>
+        <p:spPr>
+          <a:xfrm>
+            <a:off x="6561448" y="3905366"/>
+            <a:ext cx="246743" cy="521299"/>
+          </a:xfrm>
+          <a:prstGeom prst="frame">
+            <a:avLst>
+              <a:gd name="adj1" fmla="val 12425"/>
+            </a:avLst>
+          </a:prstGeom>
+          <a:solidFill>
+            <a:srgbClr val="00B0F0"/>
+          </a:solidFill>
+          <a:ln>
+            <a:noFill/>
+          </a:ln>
+        </p:spPr>
+        <p:style>
+          <a:lnRef idx="2">
+            <a:schemeClr val="accent1">
+              <a:shade val="15000"/>
+            </a:schemeClr>
+          </a:lnRef>
+          <a:fillRef idx="1">
+            <a:schemeClr val="accent1"/>
+          </a:fillRef>
+          <a:effectRef idx="0">
+            <a:schemeClr val="accent1"/>
+          </a:effectRef>
+          <a:fontRef idx="minor">
+            <a:schemeClr val="lt1"/>
+          </a:fontRef>
+        </p:style>
+        <p:txBody>
+          <a:bodyPr rtlCol="0" anchor="ctr"/>
+          <a:lstStyle/>
+          <a:p>
+            <a:pPr algn="ctr"/>
+            <a:endParaRPr lang="en-US">
+              <a:solidFill>
+                <a:schemeClr val="tx1"/>
+              </a:solidFill>
+            </a:endParaRPr>
+          </a:p>
+        </p:txBody>
+      </p:sp>
+      <p:sp>
+        <p:nvSpPr>
+          <p:cNvPr id="10" name="Frame 9">
+            <a:extLst>
+              <a:ext uri="{FF2B5EF4-FFF2-40B4-BE49-F238E27FC236}">
+                <a16:creationId xmlns:a16="http://schemas.microsoft.com/office/drawing/2014/main" id="{5AB0AFCB-E53F-A7AE-D29C-F8B97641AEB5}"/>
+              </a:ext>
+            </a:extLst>
+          </p:cNvPr>
+          <p:cNvSpPr/>
+          <p:nvPr/>
+        </p:nvSpPr>
+        <p:spPr>
+          <a:xfrm>
+            <a:off x="8094533" y="5419788"/>
+            <a:ext cx="201680" cy="518431"/>
+          </a:xfrm>
+          <a:prstGeom prst="frame">
+            <a:avLst>
+              <a:gd name="adj1" fmla="val 12425"/>
+            </a:avLst>
+          </a:prstGeom>
+          <a:solidFill>
+            <a:srgbClr val="00B0F0"/>
+          </a:solidFill>
+          <a:ln>
+            <a:noFill/>
+          </a:ln>
+        </p:spPr>
+        <p:style>
+          <a:lnRef idx="2">
+            <a:schemeClr val="accent1">
+              <a:shade val="15000"/>
+            </a:schemeClr>
+          </a:lnRef>
+          <a:fillRef idx="1">
+            <a:schemeClr val="accent1"/>
+          </a:fillRef>
+          <a:effectRef idx="0">
+            <a:schemeClr val="accent1"/>
+          </a:effectRef>
+          <a:fontRef idx="minor">
+            <a:schemeClr val="lt1"/>
+          </a:fontRef>
+        </p:style>
+        <p:txBody>
+          <a:bodyPr rtlCol="0" anchor="ctr"/>
+          <a:lstStyle/>
+          <a:p>
+            <a:pPr algn="ctr"/>
+            <a:endParaRPr lang="en-US">
+              <a:solidFill>
+                <a:schemeClr val="tx1"/>
+              </a:solidFill>
+            </a:endParaRPr>
+          </a:p>
+        </p:txBody>
+      </p:sp>
+      <p:sp>
+        <p:nvSpPr>
+          <p:cNvPr id="11" name="Frame 10">
+            <a:extLst>
+              <a:ext uri="{FF2B5EF4-FFF2-40B4-BE49-F238E27FC236}">
+                <a16:creationId xmlns:a16="http://schemas.microsoft.com/office/drawing/2014/main" id="{15175B43-FDA4-2444-180B-5291E6A9B62A}"/>
+              </a:ext>
+            </a:extLst>
+          </p:cNvPr>
+          <p:cNvSpPr/>
+          <p:nvPr/>
+        </p:nvSpPr>
+        <p:spPr>
+          <a:xfrm>
+            <a:off x="7372244" y="3535767"/>
+            <a:ext cx="201680" cy="518431"/>
+          </a:xfrm>
+          <a:prstGeom prst="frame">
+            <a:avLst>
+              <a:gd name="adj1" fmla="val 12425"/>
+            </a:avLst>
+          </a:prstGeom>
+          <a:solidFill>
+            <a:srgbClr val="00B0F0"/>
+          </a:solidFill>
+          <a:ln>
+            <a:noFill/>
+          </a:ln>
+        </p:spPr>
+        <p:style>
+          <a:lnRef idx="2">
+            <a:schemeClr val="accent1">
+              <a:shade val="15000"/>
+            </a:schemeClr>
+          </a:lnRef>
+          <a:fillRef idx="1">
+            <a:schemeClr val="accent1"/>
+          </a:fillRef>
+          <a:effectRef idx="0">
+            <a:schemeClr val="accent1"/>
+          </a:effectRef>
+          <a:fontRef idx="minor">
+            <a:schemeClr val="lt1"/>
+          </a:fontRef>
+        </p:style>
+        <p:txBody>
+          <a:bodyPr rtlCol="0" anchor="ctr"/>
+          <a:lstStyle/>
+          <a:p>
+            <a:pPr algn="ctr"/>
+            <a:endParaRPr lang="en-US">
+              <a:solidFill>
+                <a:schemeClr val="tx1"/>
+              </a:solidFill>
+            </a:endParaRPr>
+          </a:p>
+        </p:txBody>
+      </p:sp>
+      <p:sp>
+        <p:nvSpPr>
+          <p:cNvPr id="12" name="Frame 11">
+            <a:extLst>
+              <a:ext uri="{FF2B5EF4-FFF2-40B4-BE49-F238E27FC236}">
+                <a16:creationId xmlns:a16="http://schemas.microsoft.com/office/drawing/2014/main" id="{335E2CD2-1CD8-681C-46AD-26B9C692EFEC}"/>
+              </a:ext>
+            </a:extLst>
+          </p:cNvPr>
+          <p:cNvSpPr/>
+          <p:nvPr/>
+        </p:nvSpPr>
+        <p:spPr>
+          <a:xfrm>
+            <a:off x="8094533" y="2389977"/>
+            <a:ext cx="201680" cy="518431"/>
+          </a:xfrm>
+          <a:prstGeom prst="frame">
+            <a:avLst>
+              <a:gd name="adj1" fmla="val 12425"/>
+            </a:avLst>
+          </a:prstGeom>
+          <a:solidFill>
+            <a:srgbClr val="00B0F0"/>
+          </a:solidFill>
+          <a:ln>
+            <a:noFill/>
+          </a:ln>
+        </p:spPr>
+        <p:style>
+          <a:lnRef idx="2">
+            <a:schemeClr val="accent1">
+              <a:shade val="15000"/>
+            </a:schemeClr>
+          </a:lnRef>
+          <a:fillRef idx="1">
+            <a:schemeClr val="accent1"/>
+          </a:fillRef>
+          <a:effectRef idx="0">
+            <a:schemeClr val="accent1"/>
+          </a:effectRef>
+          <a:fontRef idx="minor">
+            <a:schemeClr val="lt1"/>
+          </a:fontRef>
+        </p:style>
+        <p:txBody>
+          <a:bodyPr rtlCol="0" anchor="ctr"/>
+          <a:lstStyle/>
+          <a:p>
+            <a:pPr algn="ctr"/>
+            <a:endParaRPr lang="en-US">
+              <a:solidFill>
+                <a:schemeClr val="tx1"/>
+              </a:solidFill>
+            </a:endParaRPr>
+          </a:p>
+        </p:txBody>
+      </p:sp>
+      <p:sp>
+        <p:nvSpPr>
+          <p:cNvPr id="13" name="Frame 12">
+            <a:extLst>
+              <a:ext uri="{FF2B5EF4-FFF2-40B4-BE49-F238E27FC236}">
+                <a16:creationId xmlns:a16="http://schemas.microsoft.com/office/drawing/2014/main" id="{010F34BA-1927-04D4-5577-5DCF4D601A37}"/>
+              </a:ext>
+            </a:extLst>
+          </p:cNvPr>
+          <p:cNvSpPr/>
+          <p:nvPr/>
+        </p:nvSpPr>
+        <p:spPr>
+          <a:xfrm>
+            <a:off x="7314366" y="1871546"/>
+            <a:ext cx="201680" cy="518431"/>
+          </a:xfrm>
+          <a:prstGeom prst="frame">
+            <a:avLst>
+              <a:gd name="adj1" fmla="val 12425"/>
+            </a:avLst>
+          </a:prstGeom>
+          <a:solidFill>
+            <a:srgbClr val="00B0F0"/>
+          </a:solidFill>
+          <a:ln>
+            <a:noFill/>
+          </a:ln>
+        </p:spPr>
+        <p:style>
+          <a:lnRef idx="2">
+            <a:schemeClr val="accent1">
+              <a:shade val="15000"/>
+            </a:schemeClr>
+          </a:lnRef>
+          <a:fillRef idx="1">
+            <a:schemeClr val="accent1"/>
+          </a:fillRef>
+          <a:effectRef idx="0">
+            <a:schemeClr val="accent1"/>
+          </a:effectRef>
+          <a:fontRef idx="minor">
+            <a:schemeClr val="lt1"/>
+          </a:fontRef>
+        </p:style>
+        <p:txBody>
+          <a:bodyPr rtlCol="0" anchor="ctr"/>
+          <a:lstStyle/>
+          <a:p>
+            <a:pPr algn="ctr"/>
+            <a:endParaRPr lang="en-US">
+              <a:solidFill>
+                <a:schemeClr val="tx1"/>
+              </a:solidFill>
+            </a:endParaRPr>
+          </a:p>
+        </p:txBody>
+      </p:sp>
+      <p:sp>
+        <p:nvSpPr>
+          <p:cNvPr id="14" name="Frame 13">
+            <a:extLst>
+              <a:ext uri="{FF2B5EF4-FFF2-40B4-BE49-F238E27FC236}">
+                <a16:creationId xmlns:a16="http://schemas.microsoft.com/office/drawing/2014/main" id="{7D5425C5-94D6-97FC-780B-0C4E4310333D}"/>
+              </a:ext>
+            </a:extLst>
+          </p:cNvPr>
+          <p:cNvSpPr/>
+          <p:nvPr/>
+        </p:nvSpPr>
+        <p:spPr>
+          <a:xfrm>
+            <a:off x="6460608" y="1768621"/>
+            <a:ext cx="201680" cy="518431"/>
+          </a:xfrm>
+          <a:prstGeom prst="frame">
+            <a:avLst>
+              <a:gd name="adj1" fmla="val 12425"/>
+            </a:avLst>
+          </a:prstGeom>
+          <a:solidFill>
+            <a:srgbClr val="00B0F0"/>
+          </a:solidFill>
+          <a:ln>
+            <a:noFill/>
+          </a:ln>
+        </p:spPr>
+        <p:style>
+          <a:lnRef idx="2">
+            <a:schemeClr val="accent1">
+              <a:shade val="15000"/>
+            </a:schemeClr>
+          </a:lnRef>
+          <a:fillRef idx="1">
+            <a:schemeClr val="accent1"/>
+          </a:fillRef>
+          <a:effectRef idx="0">
+            <a:schemeClr val="accent1"/>
+          </a:effectRef>
+          <a:fontRef idx="minor">
+            <a:schemeClr val="lt1"/>
+          </a:fontRef>
+        </p:style>
+        <p:txBody>
+          <a:bodyPr rtlCol="0" anchor="ctr"/>
+          <a:lstStyle/>
+          <a:p>
+            <a:pPr algn="ctr"/>
+            <a:endParaRPr lang="en-US">
+              <a:solidFill>
+                <a:schemeClr val="tx1"/>
+              </a:solidFill>
+            </a:endParaRPr>
+          </a:p>
+        </p:txBody>
+      </p:sp>
+      <p:sp>
+        <p:nvSpPr>
+          <p:cNvPr id="15" name="Frame 14">
+            <a:extLst>
+              <a:ext uri="{FF2B5EF4-FFF2-40B4-BE49-F238E27FC236}">
+                <a16:creationId xmlns:a16="http://schemas.microsoft.com/office/drawing/2014/main" id="{7DE59EF7-71C2-0056-ACAE-FE531CF89C3E}"/>
+              </a:ext>
+            </a:extLst>
+          </p:cNvPr>
+          <p:cNvSpPr/>
+          <p:nvPr/>
+        </p:nvSpPr>
+        <p:spPr>
+          <a:xfrm>
+            <a:off x="3579138" y="1569794"/>
+            <a:ext cx="201680" cy="518431"/>
+          </a:xfrm>
+          <a:prstGeom prst="frame">
+            <a:avLst>
+              <a:gd name="adj1" fmla="val 12425"/>
+            </a:avLst>
+          </a:prstGeom>
+          <a:solidFill>
+            <a:srgbClr val="00B0F0"/>
+          </a:solidFill>
+          <a:ln>
+            <a:noFill/>
+          </a:ln>
+        </p:spPr>
+        <p:style>
+          <a:lnRef idx="2">
+            <a:schemeClr val="accent1">
+              <a:shade val="15000"/>
+            </a:schemeClr>
+          </a:lnRef>
+          <a:fillRef idx="1">
+            <a:schemeClr val="accent1"/>
+          </a:fillRef>
+          <a:effectRef idx="0">
+            <a:schemeClr val="accent1"/>
+          </a:effectRef>
+          <a:fontRef idx="minor">
+            <a:schemeClr val="lt1"/>
+          </a:fontRef>
+        </p:style>
+        <p:txBody>
+          <a:bodyPr rtlCol="0" anchor="ctr"/>
+          <a:lstStyle/>
+          <a:p>
+            <a:pPr algn="ctr"/>
+            <a:endParaRPr lang="en-US">
+              <a:solidFill>
+                <a:schemeClr val="tx1"/>
+              </a:solidFill>
+            </a:endParaRPr>
+          </a:p>
+        </p:txBody>
+      </p:sp>
+      <p:sp>
+        <p:nvSpPr>
+          <p:cNvPr id="16" name="Frame 15">
+            <a:extLst>
+              <a:ext uri="{FF2B5EF4-FFF2-40B4-BE49-F238E27FC236}">
+                <a16:creationId xmlns:a16="http://schemas.microsoft.com/office/drawing/2014/main" id="{63349D9E-D450-8BCC-28C1-64E3E8FFC5BF}"/>
+              </a:ext>
+            </a:extLst>
+          </p:cNvPr>
+          <p:cNvSpPr/>
+          <p:nvPr/>
+        </p:nvSpPr>
+        <p:spPr>
+          <a:xfrm>
+            <a:off x="3452181" y="3144470"/>
+            <a:ext cx="201680" cy="518431"/>
+          </a:xfrm>
+          <a:prstGeom prst="frame">
+            <a:avLst>
+              <a:gd name="adj1" fmla="val 12425"/>
+            </a:avLst>
+          </a:prstGeom>
+          <a:solidFill>
+            <a:srgbClr val="00B0F0"/>
+          </a:solidFill>
+          <a:ln>
+            <a:noFill/>
+          </a:ln>
+        </p:spPr>
+        <p:style>
+          <a:lnRef idx="2">
+            <a:schemeClr val="accent1">
+              <a:shade val="15000"/>
+            </a:schemeClr>
+          </a:lnRef>
+          <a:fillRef idx="1">
+            <a:schemeClr val="accent1"/>
+          </a:fillRef>
+          <a:effectRef idx="0">
+            <a:schemeClr val="accent1"/>
+          </a:effectRef>
+          <a:fontRef idx="minor">
+            <a:schemeClr val="lt1"/>
+          </a:fontRef>
+        </p:style>
+        <p:txBody>
+          <a:bodyPr rtlCol="0" anchor="ctr"/>
+          <a:lstStyle/>
+          <a:p>
+            <a:pPr algn="ctr"/>
+            <a:endParaRPr lang="en-US">
+              <a:solidFill>
+                <a:schemeClr val="tx1"/>
+              </a:solidFill>
+            </a:endParaRPr>
+          </a:p>
+        </p:txBody>
+      </p:sp>
+      <p:sp>
+        <p:nvSpPr>
+          <p:cNvPr id="17" name="Frame 16">
+            <a:extLst>
+              <a:ext uri="{FF2B5EF4-FFF2-40B4-BE49-F238E27FC236}">
+                <a16:creationId xmlns:a16="http://schemas.microsoft.com/office/drawing/2014/main" id="{CB0C6789-835C-FE11-3005-BC8DA607F22E}"/>
+              </a:ext>
+            </a:extLst>
+          </p:cNvPr>
+          <p:cNvSpPr/>
+          <p:nvPr/>
+        </p:nvSpPr>
+        <p:spPr>
+          <a:xfrm>
+            <a:off x="5770947" y="2544183"/>
+            <a:ext cx="201680" cy="518431"/>
+          </a:xfrm>
+          <a:prstGeom prst="frame">
+            <a:avLst>
+              <a:gd name="adj1" fmla="val 12425"/>
+            </a:avLst>
+          </a:prstGeom>
+          <a:solidFill>
+            <a:srgbClr val="00B0F0"/>
+          </a:solidFill>
+          <a:ln>
+            <a:noFill/>
+          </a:ln>
+        </p:spPr>
+        <p:style>
+          <a:lnRef idx="2">
+            <a:schemeClr val="accent1">
+              <a:shade val="15000"/>
+            </a:schemeClr>
+          </a:lnRef>
+          <a:fillRef idx="1">
+            <a:schemeClr val="accent1"/>
+          </a:fillRef>
+          <a:effectRef idx="0">
+            <a:schemeClr val="accent1"/>
+          </a:effectRef>
+          <a:fontRef idx="minor">
+            <a:schemeClr val="lt1"/>
+          </a:fontRef>
+        </p:style>
+        <p:txBody>
+          <a:bodyPr rtlCol="0" anchor="ctr"/>
+          <a:lstStyle/>
+          <a:p>
+            <a:pPr algn="ctr"/>
+            <a:endParaRPr lang="en-US">
+              <a:solidFill>
+                <a:schemeClr val="tx1"/>
+              </a:solidFill>
+            </a:endParaRPr>
+          </a:p>
+        </p:txBody>
+      </p:sp>
+      <p:sp>
+        <p:nvSpPr>
+          <p:cNvPr id="18" name="Frame 17">
+            <a:extLst>
+              <a:ext uri="{FF2B5EF4-FFF2-40B4-BE49-F238E27FC236}">
+                <a16:creationId xmlns:a16="http://schemas.microsoft.com/office/drawing/2014/main" id="{087FFBBD-CB1E-6055-70CA-32AF08DD1E85}"/>
+              </a:ext>
+            </a:extLst>
+          </p:cNvPr>
+          <p:cNvSpPr/>
+          <p:nvPr/>
+        </p:nvSpPr>
+        <p:spPr>
+          <a:xfrm>
+            <a:off x="3173152" y="5126278"/>
+            <a:ext cx="279029" cy="293510"/>
+          </a:xfrm>
+          <a:prstGeom prst="frame">
+            <a:avLst>
+              <a:gd name="adj1" fmla="val 50000"/>
+            </a:avLst>
+          </a:prstGeom>
+          <a:solidFill>
+            <a:srgbClr val="00B0F0"/>
+          </a:solidFill>
+          <a:ln>
+            <a:noFill/>
+          </a:ln>
+        </p:spPr>
+        <p:style>
+          <a:lnRef idx="2">
+            <a:schemeClr val="accent1">
+              <a:shade val="15000"/>
+            </a:schemeClr>
+          </a:lnRef>
+          <a:fillRef idx="1">
+            <a:schemeClr val="accent1"/>
+          </a:fillRef>
+          <a:effectRef idx="0">
+            <a:schemeClr val="accent1"/>
+          </a:effectRef>
+          <a:fontRef idx="minor">
+            <a:schemeClr val="lt1"/>
+          </a:fontRef>
+        </p:style>
+        <p:txBody>
+          <a:bodyPr rtlCol="0" anchor="ctr"/>
+          <a:lstStyle/>
+          <a:p>
+            <a:pPr algn="ctr"/>
+            <a:endParaRPr lang="en-US">
+              <a:solidFill>
+                <a:schemeClr val="tx1"/>
+              </a:solidFill>
+            </a:endParaRPr>
+          </a:p>
+        </p:txBody>
+      </p:sp>
+      <p:sp>
+        <p:nvSpPr>
+          <p:cNvPr id="19" name="Frame 18">
+            <a:extLst>
+              <a:ext uri="{FF2B5EF4-FFF2-40B4-BE49-F238E27FC236}">
+                <a16:creationId xmlns:a16="http://schemas.microsoft.com/office/drawing/2014/main" id="{EDA31CB4-F356-A3EC-EF64-642E6644ECB6}"/>
+              </a:ext>
+            </a:extLst>
+          </p:cNvPr>
+          <p:cNvSpPr/>
+          <p:nvPr/>
+        </p:nvSpPr>
+        <p:spPr>
+          <a:xfrm>
+            <a:off x="3173152" y="5538687"/>
+            <a:ext cx="279029" cy="293510"/>
+          </a:xfrm>
+          <a:prstGeom prst="frame">
+            <a:avLst>
+              <a:gd name="adj1" fmla="val 50000"/>
+            </a:avLst>
+          </a:prstGeom>
+          <a:solidFill>
+            <a:schemeClr val="accent4">
+              <a:lumMod val="60000"/>
+              <a:lumOff val="40000"/>
+            </a:schemeClr>
+          </a:solidFill>
+          <a:ln>
+            <a:noFill/>
+          </a:ln>
+        </p:spPr>
+        <p:style>
+          <a:lnRef idx="2">
+            <a:schemeClr val="accent1">
+              <a:shade val="15000"/>
+            </a:schemeClr>
+          </a:lnRef>
+          <a:fillRef idx="1">
+            <a:schemeClr val="accent1"/>
+          </a:fillRef>
+          <a:effectRef idx="0">
+            <a:schemeClr val="accent1"/>
+          </a:effectRef>
+          <a:fontRef idx="minor">
+            <a:schemeClr val="lt1"/>
+          </a:fontRef>
+        </p:style>
+        <p:txBody>
+          <a:bodyPr rtlCol="0" anchor="ctr"/>
+          <a:lstStyle/>
+          <a:p>
+            <a:pPr algn="ctr"/>
+            <a:endParaRPr lang="en-US">
+              <a:solidFill>
+                <a:schemeClr val="tx1"/>
+              </a:solidFill>
+            </a:endParaRPr>
+          </a:p>
+        </p:txBody>
+      </p:sp>
+      <p:sp>
+        <p:nvSpPr>
+          <p:cNvPr id="20" name="TextBox 19">
+            <a:extLst>
+              <a:ext uri="{FF2B5EF4-FFF2-40B4-BE49-F238E27FC236}">
+                <a16:creationId xmlns:a16="http://schemas.microsoft.com/office/drawing/2014/main" id="{B12D9CD9-C1CB-AA8B-C77B-08898BD3EDC0}"/>
+              </a:ext>
+            </a:extLst>
+          </p:cNvPr>
+          <p:cNvSpPr txBox="1"/>
+          <p:nvPr/>
+        </p:nvSpPr>
+        <p:spPr>
+          <a:xfrm>
+            <a:off x="3553021" y="5070478"/>
+            <a:ext cx="2195395" cy="369332"/>
+          </a:xfrm>
+          <a:prstGeom prst="rect">
+            <a:avLst/>
+          </a:prstGeom>
+          <a:noFill/>
+        </p:spPr>
+        <p:txBody>
+          <a:bodyPr wrap="square" rtlCol="0">
+            <a:spAutoFit/>
+          </a:bodyPr>
+          <a:lstStyle/>
+          <a:p>
+            <a:r>
+              <a:rPr lang="en-US" dirty="0">
+                <a:solidFill>
+                  <a:schemeClr val="bg1"/>
+                </a:solidFill>
+              </a:rPr>
+              <a:t>Selected stars</a:t>
+            </a:r>
+          </a:p>
+        </p:txBody>
+      </p:sp>
+      <p:sp>
+        <p:nvSpPr>
+          <p:cNvPr id="21" name="TextBox 20">
+            <a:extLst>
+              <a:ext uri="{FF2B5EF4-FFF2-40B4-BE49-F238E27FC236}">
+                <a16:creationId xmlns:a16="http://schemas.microsoft.com/office/drawing/2014/main" id="{6E71302B-EC9C-9ABE-B346-752E87325A33}"/>
+              </a:ext>
+            </a:extLst>
+          </p:cNvPr>
+          <p:cNvSpPr txBox="1"/>
+          <p:nvPr/>
+        </p:nvSpPr>
+        <p:spPr>
+          <a:xfrm>
+            <a:off x="3553021" y="5462865"/>
+            <a:ext cx="2195395" cy="369332"/>
+          </a:xfrm>
+          <a:prstGeom prst="rect">
+            <a:avLst/>
+          </a:prstGeom>
+          <a:noFill/>
+        </p:spPr>
+        <p:txBody>
+          <a:bodyPr wrap="square" rtlCol="0">
+            <a:spAutoFit/>
+          </a:bodyPr>
+          <a:lstStyle/>
+          <a:p>
+            <a:r>
+              <a:rPr lang="en-US" dirty="0">
+                <a:solidFill>
+                  <a:schemeClr val="bg1"/>
+                </a:solidFill>
+              </a:rPr>
+              <a:t>Objects</a:t>
+            </a:r>
+          </a:p>
+        </p:txBody>
+      </p:sp>
+    </p:spTree>
+    <p:extLst>
+      <p:ext uri="{BB962C8B-B14F-4D97-AF65-F5344CB8AC3E}">
+        <p14:creationId xmlns:p14="http://schemas.microsoft.com/office/powerpoint/2010/main" val="3667123200"/>
+      </p:ext>
+    </p:extLst>
+  </p:cSld>
+  <p:clrMapOvr>
+    <a:masterClrMapping/>
+  </p:clrMapOvr>
+</p:sld>
+</file>
+
 <file path=ppt/theme/theme1.xml><?xml version="1.0" encoding="utf-8"?>
 <a:theme xmlns:a="http://schemas.openxmlformats.org/drawingml/2006/main" name="Office Theme">
   <a:themeElements>

</xml_diff>